<commit_message>
- Correções prévias realizadas. Metade cap 5 e nova conclusão pelo orientador.
- Ficha catalográfica adicionada.

- Formatado para o padrão do programa.
</commit_message>
<xml_diff>
--- a/Figures/genericBlockDiagramCommunications.pptx
+++ b/Figures/genericBlockDiagramCommunications.pptx
@@ -208,7 +208,7 @@
           <a:p>
             <a:fld id="{68E42D50-087F-43D2-99AA-4863E42CF0E8}" type="datetimeFigureOut">
               <a:rPr lang="pt-BR" smtClean="0"/>
-              <a:t>21/03/2014</a:t>
+              <a:t>12/09/2014</a:t>
             </a:fld>
             <a:endParaRPr lang="pt-BR"/>
           </a:p>
@@ -367,7 +367,7 @@
           <a:p>
             <a:fld id="{E0C22F06-E74D-463D-96DD-8BD4984889F8}" type="slidenum">
               <a:rPr lang="pt-BR" smtClean="0"/>
-              <a:t>‹#›</a:t>
+              <a:t>‹nº›</a:t>
             </a:fld>
             <a:endParaRPr lang="pt-BR"/>
           </a:p>
@@ -747,7 +747,7 @@
             <a:fld id="{3ECEDDD1-02F4-488A-9AC5-C581CF75A9CB}" type="datetimeFigureOut">
               <a:rPr lang="pt-BR" smtClean="0"/>
               <a:pPr/>
-              <a:t>21/03/2014</a:t>
+              <a:t>12/09/2014</a:t>
             </a:fld>
             <a:endParaRPr lang="pt-BR"/>
           </a:p>
@@ -790,7 +790,7 @@
             <a:fld id="{64423969-70E0-4A52-B5D9-B4270798E610}" type="slidenum">
               <a:rPr lang="pt-BR" smtClean="0"/>
               <a:pPr/>
-              <a:t>‹#›</a:t>
+              <a:t>‹nº›</a:t>
             </a:fld>
             <a:endParaRPr lang="pt-BR"/>
           </a:p>
@@ -914,7 +914,7 @@
             <a:fld id="{3ECEDDD1-02F4-488A-9AC5-C581CF75A9CB}" type="datetimeFigureOut">
               <a:rPr lang="pt-BR" smtClean="0"/>
               <a:pPr/>
-              <a:t>21/03/2014</a:t>
+              <a:t>12/09/2014</a:t>
             </a:fld>
             <a:endParaRPr lang="pt-BR"/>
           </a:p>
@@ -957,7 +957,7 @@
             <a:fld id="{64423969-70E0-4A52-B5D9-B4270798E610}" type="slidenum">
               <a:rPr lang="pt-BR" smtClean="0"/>
               <a:pPr/>
-              <a:t>‹#›</a:t>
+              <a:t>‹nº›</a:t>
             </a:fld>
             <a:endParaRPr lang="pt-BR"/>
           </a:p>
@@ -1091,7 +1091,7 @@
             <a:fld id="{3ECEDDD1-02F4-488A-9AC5-C581CF75A9CB}" type="datetimeFigureOut">
               <a:rPr lang="pt-BR" smtClean="0"/>
               <a:pPr/>
-              <a:t>21/03/2014</a:t>
+              <a:t>12/09/2014</a:t>
             </a:fld>
             <a:endParaRPr lang="pt-BR"/>
           </a:p>
@@ -1134,7 +1134,7 @@
             <a:fld id="{64423969-70E0-4A52-B5D9-B4270798E610}" type="slidenum">
               <a:rPr lang="pt-BR" smtClean="0"/>
               <a:pPr/>
-              <a:t>‹#›</a:t>
+              <a:t>‹nº›</a:t>
             </a:fld>
             <a:endParaRPr lang="pt-BR"/>
           </a:p>
@@ -1258,7 +1258,7 @@
             <a:fld id="{3ECEDDD1-02F4-488A-9AC5-C581CF75A9CB}" type="datetimeFigureOut">
               <a:rPr lang="pt-BR" smtClean="0"/>
               <a:pPr/>
-              <a:t>21/03/2014</a:t>
+              <a:t>12/09/2014</a:t>
             </a:fld>
             <a:endParaRPr lang="pt-BR"/>
           </a:p>
@@ -1301,7 +1301,7 @@
             <a:fld id="{64423969-70E0-4A52-B5D9-B4270798E610}" type="slidenum">
               <a:rPr lang="pt-BR" smtClean="0"/>
               <a:pPr/>
-              <a:t>‹#›</a:t>
+              <a:t>‹nº›</a:t>
             </a:fld>
             <a:endParaRPr lang="pt-BR"/>
           </a:p>
@@ -1501,7 +1501,7 @@
             <a:fld id="{3ECEDDD1-02F4-488A-9AC5-C581CF75A9CB}" type="datetimeFigureOut">
               <a:rPr lang="pt-BR" smtClean="0"/>
               <a:pPr/>
-              <a:t>21/03/2014</a:t>
+              <a:t>12/09/2014</a:t>
             </a:fld>
             <a:endParaRPr lang="pt-BR"/>
           </a:p>
@@ -1544,7 +1544,7 @@
             <a:fld id="{64423969-70E0-4A52-B5D9-B4270798E610}" type="slidenum">
               <a:rPr lang="pt-BR" smtClean="0"/>
               <a:pPr/>
-              <a:t>‹#›</a:t>
+              <a:t>‹nº›</a:t>
             </a:fld>
             <a:endParaRPr lang="pt-BR"/>
           </a:p>
@@ -1786,7 +1786,7 @@
             <a:fld id="{3ECEDDD1-02F4-488A-9AC5-C581CF75A9CB}" type="datetimeFigureOut">
               <a:rPr lang="pt-BR" smtClean="0"/>
               <a:pPr/>
-              <a:t>21/03/2014</a:t>
+              <a:t>12/09/2014</a:t>
             </a:fld>
             <a:endParaRPr lang="pt-BR"/>
           </a:p>
@@ -1829,7 +1829,7 @@
             <a:fld id="{64423969-70E0-4A52-B5D9-B4270798E610}" type="slidenum">
               <a:rPr lang="pt-BR" smtClean="0"/>
               <a:pPr/>
-              <a:t>‹#›</a:t>
+              <a:t>‹nº›</a:t>
             </a:fld>
             <a:endParaRPr lang="pt-BR"/>
           </a:p>
@@ -2205,7 +2205,7 @@
             <a:fld id="{3ECEDDD1-02F4-488A-9AC5-C581CF75A9CB}" type="datetimeFigureOut">
               <a:rPr lang="pt-BR" smtClean="0"/>
               <a:pPr/>
-              <a:t>21/03/2014</a:t>
+              <a:t>12/09/2014</a:t>
             </a:fld>
             <a:endParaRPr lang="pt-BR"/>
           </a:p>
@@ -2248,7 +2248,7 @@
             <a:fld id="{64423969-70E0-4A52-B5D9-B4270798E610}" type="slidenum">
               <a:rPr lang="pt-BR" smtClean="0"/>
               <a:pPr/>
-              <a:t>‹#›</a:t>
+              <a:t>‹nº›</a:t>
             </a:fld>
             <a:endParaRPr lang="pt-BR"/>
           </a:p>
@@ -2320,7 +2320,7 @@
             <a:fld id="{3ECEDDD1-02F4-488A-9AC5-C581CF75A9CB}" type="datetimeFigureOut">
               <a:rPr lang="pt-BR" smtClean="0"/>
               <a:pPr/>
-              <a:t>21/03/2014</a:t>
+              <a:t>12/09/2014</a:t>
             </a:fld>
             <a:endParaRPr lang="pt-BR"/>
           </a:p>
@@ -2363,7 +2363,7 @@
             <a:fld id="{64423969-70E0-4A52-B5D9-B4270798E610}" type="slidenum">
               <a:rPr lang="pt-BR" smtClean="0"/>
               <a:pPr/>
-              <a:t>‹#›</a:t>
+              <a:t>‹nº›</a:t>
             </a:fld>
             <a:endParaRPr lang="pt-BR"/>
           </a:p>
@@ -2412,7 +2412,7 @@
             <a:fld id="{3ECEDDD1-02F4-488A-9AC5-C581CF75A9CB}" type="datetimeFigureOut">
               <a:rPr lang="pt-BR" smtClean="0"/>
               <a:pPr/>
-              <a:t>21/03/2014</a:t>
+              <a:t>12/09/2014</a:t>
             </a:fld>
             <a:endParaRPr lang="pt-BR"/>
           </a:p>
@@ -2455,7 +2455,7 @@
             <a:fld id="{64423969-70E0-4A52-B5D9-B4270798E610}" type="slidenum">
               <a:rPr lang="pt-BR" smtClean="0"/>
               <a:pPr/>
-              <a:t>‹#›</a:t>
+              <a:t>‹nº›</a:t>
             </a:fld>
             <a:endParaRPr lang="pt-BR"/>
           </a:p>
@@ -2686,7 +2686,7 @@
             <a:fld id="{3ECEDDD1-02F4-488A-9AC5-C581CF75A9CB}" type="datetimeFigureOut">
               <a:rPr lang="pt-BR" smtClean="0"/>
               <a:pPr/>
-              <a:t>21/03/2014</a:t>
+              <a:t>12/09/2014</a:t>
             </a:fld>
             <a:endParaRPr lang="pt-BR"/>
           </a:p>
@@ -2729,7 +2729,7 @@
             <a:fld id="{64423969-70E0-4A52-B5D9-B4270798E610}" type="slidenum">
               <a:rPr lang="pt-BR" smtClean="0"/>
               <a:pPr/>
-              <a:t>‹#›</a:t>
+              <a:t>‹nº›</a:t>
             </a:fld>
             <a:endParaRPr lang="pt-BR"/>
           </a:p>
@@ -2936,7 +2936,7 @@
             <a:fld id="{3ECEDDD1-02F4-488A-9AC5-C581CF75A9CB}" type="datetimeFigureOut">
               <a:rPr lang="pt-BR" smtClean="0"/>
               <a:pPr/>
-              <a:t>21/03/2014</a:t>
+              <a:t>12/09/2014</a:t>
             </a:fld>
             <a:endParaRPr lang="pt-BR"/>
           </a:p>
@@ -2979,7 +2979,7 @@
             <a:fld id="{64423969-70E0-4A52-B5D9-B4270798E610}" type="slidenum">
               <a:rPr lang="pt-BR" smtClean="0"/>
               <a:pPr/>
-              <a:t>‹#›</a:t>
+              <a:t>‹nº›</a:t>
             </a:fld>
             <a:endParaRPr lang="pt-BR"/>
           </a:p>
@@ -3146,7 +3146,7 @@
             <a:fld id="{3ECEDDD1-02F4-488A-9AC5-C581CF75A9CB}" type="datetimeFigureOut">
               <a:rPr lang="pt-BR" smtClean="0"/>
               <a:pPr/>
-              <a:t>21/03/2014</a:t>
+              <a:t>12/09/2014</a:t>
             </a:fld>
             <a:endParaRPr lang="pt-BR"/>
           </a:p>
@@ -3225,7 +3225,7 @@
             <a:fld id="{64423969-70E0-4A52-B5D9-B4270798E610}" type="slidenum">
               <a:rPr lang="pt-BR" smtClean="0"/>
               <a:pPr/>
-              <a:t>‹#›</a:t>
+              <a:t>‹nº›</a:t>
             </a:fld>
             <a:endParaRPr lang="pt-BR"/>
           </a:p>
@@ -4768,6 +4768,80 @@
           </a:prstGeom>
           <a:ln>
             <a:tailEnd type="triangle"/>
+          </a:ln>
+        </p:spPr>
+        <p:style>
+          <a:lnRef idx="1">
+            <a:schemeClr val="accent1"/>
+          </a:lnRef>
+          <a:fillRef idx="0">
+            <a:schemeClr val="accent1"/>
+          </a:fillRef>
+          <a:effectRef idx="0">
+            <a:schemeClr val="accent1"/>
+          </a:effectRef>
+          <a:fontRef idx="minor">
+            <a:schemeClr val="tx1"/>
+          </a:fontRef>
+        </p:style>
+      </p:cxnSp>
+      <p:cxnSp>
+        <p:nvCxnSpPr>
+          <p:cNvPr id="3" name="Conector de seta reta 2"/>
+          <p:cNvCxnSpPr/>
+          <p:nvPr/>
+        </p:nvCxnSpPr>
+        <p:spPr>
+          <a:xfrm flipV="1">
+            <a:off x="5364497" y="2594290"/>
+            <a:ext cx="0" cy="321910"/>
+          </a:xfrm>
+          <a:prstGeom prst="straightConnector1">
+            <a:avLst/>
+          </a:prstGeom>
+          <a:ln w="38100">
+            <a:solidFill>
+              <a:schemeClr val="tx1"/>
+            </a:solidFill>
+            <a:headEnd type="none" w="med" len="med"/>
+            <a:tailEnd type="arrow" w="med" len="med"/>
+          </a:ln>
+        </p:spPr>
+        <p:style>
+          <a:lnRef idx="1">
+            <a:schemeClr val="accent1"/>
+          </a:lnRef>
+          <a:fillRef idx="0">
+            <a:schemeClr val="accent1"/>
+          </a:fillRef>
+          <a:effectRef idx="0">
+            <a:schemeClr val="accent1"/>
+          </a:effectRef>
+          <a:fontRef idx="minor">
+            <a:schemeClr val="tx1"/>
+          </a:fontRef>
+        </p:style>
+      </p:cxnSp>
+      <p:cxnSp>
+        <p:nvCxnSpPr>
+          <p:cNvPr id="39" name="Conector de seta reta 38"/>
+          <p:cNvCxnSpPr/>
+          <p:nvPr/>
+        </p:nvCxnSpPr>
+        <p:spPr>
+          <a:xfrm flipV="1">
+            <a:off x="5364497" y="3098346"/>
+            <a:ext cx="0" cy="321910"/>
+          </a:xfrm>
+          <a:prstGeom prst="straightConnector1">
+            <a:avLst/>
+          </a:prstGeom>
+          <a:ln w="38100">
+            <a:solidFill>
+              <a:schemeClr val="tx1"/>
+            </a:solidFill>
+            <a:headEnd type="arrow" w="med" len="med"/>
+            <a:tailEnd type="none" w="med" len="med"/>
           </a:ln>
         </p:spPr>
         <p:style>

</xml_diff>